<commit_message>
angular slide update from last workshop
</commit_message>
<xml_diff>
--- a/angular2/slides/06_forms.pptx
+++ b/angular2/slides/06_forms.pptx
@@ -277,7 +277,7 @@
               <a:pPr>
                 <a:defRPr/>
               </a:pPr>
-              <a:t>7/28/2016</a:t>
+              <a:t>11/9/2016</a:t>
             </a:fld>
             <a:endParaRPr lang="en-US"/>
           </a:p>
@@ -3395,20 +3395,9 @@
           <a:bodyPr/>
           <a:lstStyle/>
           <a:p>
-            <a:r>
-              <a:rPr lang="en-US" dirty="0"/>
-              <a:t>Current scenario:</a:t>
-            </a:r>
-          </a:p>
-          <a:p>
-            <a:pPr lvl="1"/>
-            <a:r>
-              <a:rPr lang="en-US" dirty="0"/>
-              <a:t>Explicitly disable deprecated forms API</a:t>
-            </a:r>
-          </a:p>
-          <a:p>
-            <a:pPr lvl="1"/>
+            <a:pPr marL="457200" lvl="1" indent="0">
+              <a:buNone/>
+            </a:pPr>
             <a:r>
               <a:rPr lang="en-US" dirty="0"/>
               <a:t>Enable new forms API</a:t>
@@ -3432,7 +3421,7 @@
         </p:blipFill>
         <p:spPr>
           <a:xfrm>
-            <a:off x="929446" y="2743200"/>
+            <a:off x="929446" y="2362200"/>
             <a:ext cx="7285107" cy="3460141"/>
           </a:xfrm>
           <a:prstGeom prst="rect">

</xml_diff>